<commit_message>
small modifications to syntax and semantics
</commit_message>
<xml_diff>
--- a/semantics.pptx
+++ b/semantics.pptx
@@ -221,7 +221,7 @@
           <a:p>
             <a:fld id="{3BA3126A-9D2D-4B4A-8971-6014467F0872}" type="datetimeFigureOut">
               <a:rPr lang="en-US" smtClean="0"/>
-              <a:t>1/14/20</a:t>
+              <a:t>2/26/20</a:t>
             </a:fld>
             <a:endParaRPr lang="en-US"/>
           </a:p>
@@ -635,7 +635,7 @@
           <a:p>
             <a:fld id="{C4F7C10F-CACD-BC45-8FD3-842F0A9255EB}" type="datetime1">
               <a:rPr lang="en-US" smtClean="0"/>
-              <a:t>1/14/20</a:t>
+              <a:t>2/26/20</a:t>
             </a:fld>
             <a:endParaRPr lang="en-US"/>
           </a:p>
@@ -836,7 +836,7 @@
           <a:p>
             <a:fld id="{A7BE4BC0-3459-794A-A887-5632D7972A29}" type="datetime1">
               <a:rPr lang="en-US" smtClean="0"/>
-              <a:t>1/14/20</a:t>
+              <a:t>2/26/20</a:t>
             </a:fld>
             <a:endParaRPr lang="en-US"/>
           </a:p>
@@ -1047,7 +1047,7 @@
           <a:p>
             <a:fld id="{F742135D-B5DA-B74E-9E36-B446429B5DB2}" type="datetime1">
               <a:rPr lang="en-US" smtClean="0"/>
-              <a:t>1/14/20</a:t>
+              <a:t>2/26/20</a:t>
             </a:fld>
             <a:endParaRPr lang="en-US"/>
           </a:p>
@@ -1248,7 +1248,7 @@
           <a:p>
             <a:fld id="{1FB2F660-2A7E-4449-BC16-F03A8E8D72C1}" type="datetime1">
               <a:rPr lang="en-US" smtClean="0"/>
-              <a:t>1/14/20</a:t>
+              <a:t>2/26/20</a:t>
             </a:fld>
             <a:endParaRPr lang="en-US"/>
           </a:p>
@@ -1526,7 +1526,7 @@
           <a:p>
             <a:fld id="{ACF5311F-5D17-A644-902C-CD53A0E9F565}" type="datetime1">
               <a:rPr lang="en-US" smtClean="0"/>
-              <a:t>1/14/20</a:t>
+              <a:t>2/26/20</a:t>
             </a:fld>
             <a:endParaRPr lang="en-US"/>
           </a:p>
@@ -1794,7 +1794,7 @@
           <a:p>
             <a:fld id="{7323B60B-C76F-BD4F-8ED7-3A39496A150B}" type="datetime1">
               <a:rPr lang="en-US" smtClean="0"/>
-              <a:t>1/14/20</a:t>
+              <a:t>2/26/20</a:t>
             </a:fld>
             <a:endParaRPr lang="en-US"/>
           </a:p>
@@ -2209,7 +2209,7 @@
           <a:p>
             <a:fld id="{F8B69401-E09A-CA4A-9619-995AEA6D3123}" type="datetime1">
               <a:rPr lang="en-US" smtClean="0"/>
-              <a:t>1/14/20</a:t>
+              <a:t>2/26/20</a:t>
             </a:fld>
             <a:endParaRPr lang="en-US"/>
           </a:p>
@@ -2353,7 +2353,7 @@
           <a:p>
             <a:fld id="{C920AE4A-2A10-8245-9029-D816474677FF}" type="datetime1">
               <a:rPr lang="en-US" smtClean="0"/>
-              <a:t>1/14/20</a:t>
+              <a:t>2/26/20</a:t>
             </a:fld>
             <a:endParaRPr lang="en-US"/>
           </a:p>
@@ -2469,7 +2469,7 @@
           <a:p>
             <a:fld id="{CC287C52-3C16-584A-BA20-2441D6FBEB8D}" type="datetime1">
               <a:rPr lang="en-US" smtClean="0"/>
-              <a:t>1/14/20</a:t>
+              <a:t>2/26/20</a:t>
             </a:fld>
             <a:endParaRPr lang="en-US"/>
           </a:p>
@@ -2783,7 +2783,7 @@
           <a:p>
             <a:fld id="{DC303B03-4E07-294B-BDDF-858305A25AD4}" type="datetime1">
               <a:rPr lang="en-US" smtClean="0"/>
-              <a:t>1/14/20</a:t>
+              <a:t>2/26/20</a:t>
             </a:fld>
             <a:endParaRPr lang="en-US"/>
           </a:p>
@@ -3074,7 +3074,7 @@
           <a:p>
             <a:fld id="{45E61559-019B-DD48-A4E2-FED50C364E64}" type="datetime1">
               <a:rPr lang="en-US" smtClean="0"/>
-              <a:t>1/14/20</a:t>
+              <a:t>2/26/20</a:t>
             </a:fld>
             <a:endParaRPr lang="en-US"/>
           </a:p>
@@ -3318,7 +3318,7 @@
           <a:p>
             <a:fld id="{3C828E5F-98EF-2549-B0A3-7D36CD8789F5}" type="datetime1">
               <a:rPr lang="en-US" smtClean="0"/>
-              <a:t>1/14/20</a:t>
+              <a:t>2/26/20</a:t>
             </a:fld>
             <a:endParaRPr lang="en-US"/>
           </a:p>
@@ -13582,7 +13582,7 @@
           <a:p>
             <a:r>
               <a:rPr lang="en-US" dirty="0"/>
-              <a:t>Synthesize and inherited grammars</a:t>
+              <a:t>Synthesized and inherited grammars</a:t>
             </a:r>
           </a:p>
           <a:p>
@@ -19203,7 +19203,7 @@
             <a:pPr lvl="1"/>
             <a:r>
               <a:rPr lang="en-US" dirty="0"/>
-              <a:t>Provides information to produce equivalent program</a:t>
+              <a:t>Provides information to produce equivalent programs</a:t>
             </a:r>
           </a:p>
           <a:p>
@@ -20306,7 +20306,11 @@
             <a:avLst/>
           </a:prstGeom>
           <a:noFill/>
-          <a:ln w="57150"/>
+          <a:ln w="57150">
+            <a:solidFill>
+              <a:srgbClr val="FF0000"/>
+            </a:solidFill>
+          </a:ln>
         </p:spPr>
         <p:style>
           <a:lnRef idx="2">

</xml_diff>